<commit_message>
seance1: mise à jour deno 1.30
</commit_message>
<xml_diff>
--- a/01 - Introduction/documents/Introduction à Deno.pptx
+++ b/01 - Introduction/documents/Introduction à Deno.pptx
@@ -295,7 +295,7 @@
           <a:p>
             <a:fld id="{CD5AFD8F-5A94-48C1-88E7-572D0183627F}" type="datetimeFigureOut">
               <a:rPr lang="fr-FR" smtClean="0"/>
-              <a:t>23/11/2022</a:t>
+              <a:t>28/01/2023</a:t>
             </a:fld>
             <a:endParaRPr lang="fr-FR"/>
           </a:p>
@@ -540,7 +540,7 @@
           <a:p>
             <a:fld id="{CD5AFD8F-5A94-48C1-88E7-572D0183627F}" type="datetimeFigureOut">
               <a:rPr lang="fr-FR" smtClean="0"/>
-              <a:t>23/11/2022</a:t>
+              <a:t>28/01/2023</a:t>
             </a:fld>
             <a:endParaRPr lang="fr-FR"/>
           </a:p>
@@ -748,7 +748,7 @@
           <a:p>
             <a:fld id="{CD5AFD8F-5A94-48C1-88E7-572D0183627F}" type="datetimeFigureOut">
               <a:rPr lang="fr-FR" smtClean="0"/>
-              <a:t>23/11/2022</a:t>
+              <a:t>28/01/2023</a:t>
             </a:fld>
             <a:endParaRPr lang="fr-FR"/>
           </a:p>
@@ -946,7 +946,7 @@
           <a:p>
             <a:fld id="{CD5AFD8F-5A94-48C1-88E7-572D0183627F}" type="datetimeFigureOut">
               <a:rPr lang="fr-FR" smtClean="0"/>
-              <a:t>23/11/2022</a:t>
+              <a:t>28/01/2023</a:t>
             </a:fld>
             <a:endParaRPr lang="fr-FR"/>
           </a:p>
@@ -1221,7 +1221,7 @@
           <a:p>
             <a:fld id="{CD5AFD8F-5A94-48C1-88E7-572D0183627F}" type="datetimeFigureOut">
               <a:rPr lang="fr-FR" smtClean="0"/>
-              <a:t>23/11/2022</a:t>
+              <a:t>28/01/2023</a:t>
             </a:fld>
             <a:endParaRPr lang="fr-FR"/>
           </a:p>
@@ -1486,7 +1486,7 @@
           <a:p>
             <a:fld id="{CD5AFD8F-5A94-48C1-88E7-572D0183627F}" type="datetimeFigureOut">
               <a:rPr lang="fr-FR" smtClean="0"/>
-              <a:t>23/11/2022</a:t>
+              <a:t>28/01/2023</a:t>
             </a:fld>
             <a:endParaRPr lang="fr-FR"/>
           </a:p>
@@ -1898,7 +1898,7 @@
           <a:p>
             <a:fld id="{CD5AFD8F-5A94-48C1-88E7-572D0183627F}" type="datetimeFigureOut">
               <a:rPr lang="fr-FR" smtClean="0"/>
-              <a:t>23/11/2022</a:t>
+              <a:t>28/01/2023</a:t>
             </a:fld>
             <a:endParaRPr lang="fr-FR"/>
           </a:p>
@@ -2039,7 +2039,7 @@
           <a:p>
             <a:fld id="{CD5AFD8F-5A94-48C1-88E7-572D0183627F}" type="datetimeFigureOut">
               <a:rPr lang="fr-FR" smtClean="0"/>
-              <a:t>23/11/2022</a:t>
+              <a:t>28/01/2023</a:t>
             </a:fld>
             <a:endParaRPr lang="fr-FR"/>
           </a:p>
@@ -2152,7 +2152,7 @@
           <a:p>
             <a:fld id="{CD5AFD8F-5A94-48C1-88E7-572D0183627F}" type="datetimeFigureOut">
               <a:rPr lang="fr-FR" smtClean="0"/>
-              <a:t>23/11/2022</a:t>
+              <a:t>28/01/2023</a:t>
             </a:fld>
             <a:endParaRPr lang="fr-FR"/>
           </a:p>
@@ -2463,7 +2463,7 @@
           <a:p>
             <a:fld id="{CD5AFD8F-5A94-48C1-88E7-572D0183627F}" type="datetimeFigureOut">
               <a:rPr lang="fr-FR" smtClean="0"/>
-              <a:t>23/11/2022</a:t>
+              <a:t>28/01/2023</a:t>
             </a:fld>
             <a:endParaRPr lang="fr-FR"/>
           </a:p>
@@ -2751,7 +2751,7 @@
           <a:p>
             <a:fld id="{CD5AFD8F-5A94-48C1-88E7-572D0183627F}" type="datetimeFigureOut">
               <a:rPr lang="fr-FR" smtClean="0"/>
-              <a:t>23/11/2022</a:t>
+              <a:t>28/01/2023</a:t>
             </a:fld>
             <a:endParaRPr lang="fr-FR"/>
           </a:p>
@@ -2995,7 +2995,7 @@
           <a:p>
             <a:fld id="{CD5AFD8F-5A94-48C1-88E7-572D0183627F}" type="datetimeFigureOut">
               <a:rPr lang="fr-FR" smtClean="0"/>
-              <a:t>23/11/2022</a:t>
+              <a:t>28/01/2023</a:t>
             </a:fld>
             <a:endParaRPr lang="fr-FR"/>
           </a:p>
@@ -3622,13 +3622,16 @@
               </a:rPr>
               <a:t>Deno</a:t>
             </a:r>
-            <a:endParaRPr lang="fr-FR" b="1" dirty="0">
-              <a:solidFill>
-                <a:srgbClr val="F9FAFB"/>
-              </a:solidFill>
-              <a:latin typeface="Segoe UI" panose="020B0502040204020203" pitchFamily="34" charset="0"/>
-              <a:cs typeface="Segoe UI" panose="020B0502040204020203" pitchFamily="34" charset="0"/>
-            </a:endParaRPr>
+            <a:r>
+              <a:rPr lang="fr-FR" b="1" dirty="0">
+                <a:solidFill>
+                  <a:srgbClr val="F9FAFB"/>
+                </a:solidFill>
+                <a:latin typeface="Segoe UI" panose="020B0502040204020203" pitchFamily="34" charset="0"/>
+                <a:cs typeface="Segoe UI" panose="020B0502040204020203" pitchFamily="34" charset="0"/>
+              </a:rPr>
+              <a:t> 1.29</a:t>
+            </a:r>
           </a:p>
         </p:txBody>
       </p:sp>
@@ -6551,8 +6554,22 @@
                   <a:srgbClr val="F2F2F2"/>
                 </a:solidFill>
               </a:rPr>
-              <a:t> : https://deno.land/manual@v1.28.1/introduction</a:t>
-            </a:r>
+              <a:t> : </a:t>
+            </a:r>
+            <a:r>
+              <a:rPr lang="fr-FR" dirty="0">
+                <a:solidFill>
+                  <a:srgbClr val="F2F2F2"/>
+                </a:solidFill>
+                <a:hlinkClick r:id="rId2"/>
+              </a:rPr>
+              <a:t>https://deno.land/manual@v1.28.1/introduction</a:t>
+            </a:r>
+            <a:endParaRPr lang="fr-FR" dirty="0">
+              <a:solidFill>
+                <a:srgbClr val="F2F2F2"/>
+              </a:solidFill>
+            </a:endParaRPr>
           </a:p>
           <a:p>
             <a:pPr marL="342900" indent="-342900" algn="just">
@@ -6560,11 +6577,66 @@
               <a:buChar char="•"/>
             </a:pPr>
             <a:r>
+              <a:rPr lang="fr-FR" b="1" dirty="0">
+                <a:solidFill>
+                  <a:srgbClr val="F2F2F2"/>
+                </a:solidFill>
+              </a:rPr>
+              <a:t>Nouveautés </a:t>
+            </a:r>
+            <a:r>
               <a:rPr lang="fr-FR" b="1" dirty="0" err="1">
                 <a:solidFill>
                   <a:srgbClr val="F2F2F2"/>
                 </a:solidFill>
               </a:rPr>
+              <a:t>Deno</a:t>
+            </a:r>
+            <a:r>
+              <a:rPr lang="fr-FR" b="1" dirty="0">
+                <a:solidFill>
+                  <a:srgbClr val="F2F2F2"/>
+                </a:solidFill>
+              </a:rPr>
+              <a:t> 1.28 à 1.29 </a:t>
+            </a:r>
+            <a:r>
+              <a:rPr lang="fr-FR" dirty="0">
+                <a:solidFill>
+                  <a:srgbClr val="F2F2F2"/>
+                </a:solidFill>
+              </a:rPr>
+              <a:t>: </a:t>
+            </a:r>
+            <a:r>
+              <a:rPr lang="fr-FR" dirty="0">
+                <a:solidFill>
+                  <a:srgbClr val="F2F2F2"/>
+                </a:solidFill>
+                <a:hlinkClick r:id="rId3"/>
+              </a:rPr>
+              <a:t>https://deno.com/blog/v1.29</a:t>
+            </a:r>
+            <a:r>
+              <a:rPr lang="fr-FR" dirty="0">
+                <a:solidFill>
+                  <a:srgbClr val="F2F2F2"/>
+                </a:solidFill>
+              </a:rPr>
+              <a:t> </a:t>
+            </a:r>
+          </a:p>
+          <a:p>
+            <a:pPr marL="342900" indent="-342900" algn="just">
+              <a:buFont typeface="Arial" panose="020B0604020202020204" pitchFamily="34" charset="0"/>
+              <a:buChar char="•"/>
+            </a:pPr>
+            <a:r>
+              <a:rPr lang="fr-FR" b="1" dirty="0" err="1">
+                <a:solidFill>
+                  <a:srgbClr val="F2F2F2"/>
+                </a:solidFill>
+              </a:rPr>
               <a:t>DenoDeploy</a:t>
             </a:r>
             <a:r>
@@ -6573,7 +6645,23 @@
                   <a:srgbClr val="F2F2F2"/>
                 </a:solidFill>
               </a:rPr>
-              <a:t> : plateforme de déploiement (gratuit)</a:t>
+              <a:t> : plateforme de déploiement on the </a:t>
+            </a:r>
+            <a:r>
+              <a:rPr lang="fr-FR" dirty="0" err="1">
+                <a:solidFill>
+                  <a:srgbClr val="F2F2F2"/>
+                </a:solidFill>
+              </a:rPr>
+              <a:t>edge</a:t>
+            </a:r>
+            <a:r>
+              <a:rPr lang="fr-FR" dirty="0">
+                <a:solidFill>
+                  <a:srgbClr val="F2F2F2"/>
+                </a:solidFill>
+              </a:rPr>
+              <a:t> (gratuit)</a:t>
             </a:r>
           </a:p>
           <a:p>
@@ -6984,13 +7072,13 @@
             <p:nvPr/>
           </p:nvPicPr>
           <p:blipFill>
-            <a:blip r:embed="rId2">
+            <a:blip r:embed="rId4">
               <a:extLst>
                 <a:ext uri="{28A0092B-C50C-407E-A947-70E740481C1C}">
                   <a14:useLocalDpi xmlns:a14="http://schemas.microsoft.com/office/drawing/2010/main" val="0"/>
                 </a:ext>
                 <a:ext uri="{96DAC541-7B7A-43D3-8B79-37D633B846F1}">
-                  <asvg:svgBlip xmlns:asvg="http://schemas.microsoft.com/office/drawing/2016/SVG/main" r:embed="rId3"/>
+                  <asvg:svgBlip xmlns:asvg="http://schemas.microsoft.com/office/drawing/2016/SVG/main" r:embed="rId5"/>
                 </a:ext>
               </a:extLst>
             </a:blip>
@@ -7616,7 +7704,7 @@
                   <a:srgbClr val="F2F2F2"/>
                 </a:solidFill>
               </a:rPr>
-              <a:t>Principe : </a:t>
+              <a:t>Principe (selon la faisabilité) : </a:t>
             </a:r>
           </a:p>
           <a:p>
@@ -7679,7 +7767,7 @@
                   <a:srgbClr val="F2F2F2"/>
                 </a:solidFill>
               </a:rPr>
-              <a:t>Date : Fin décembre / Début janvier</a:t>
+              <a:t>Date : 10 février (dans une semaine) si tout va bien</a:t>
             </a:r>
           </a:p>
         </p:txBody>
@@ -8243,7 +8331,7 @@
         <p:spPr>
           <a:xfrm>
             <a:off x="979905" y="4321768"/>
-            <a:ext cx="3911859" cy="1200329"/>
+            <a:ext cx="3911859" cy="923330"/>
           </a:xfrm>
           <a:prstGeom prst="rect">
             <a:avLst/>
@@ -8291,19 +8379,8 @@
                 </a:solidFill>
                 <a:hlinkClick r:id="rId4"/>
               </a:rPr>
-              <a:t>https://github.com/CPU-Paris/Ateliers-deno/tree/main/01 - Introduction</a:t>
-            </a:r>
-            <a:r>
-              <a:rPr lang="fr-FR" dirty="0">
-                <a:solidFill>
-                  <a:srgbClr val="F2F2F2"/>
-                </a:solidFill>
-              </a:rPr>
-              <a:t> </a:t>
-            </a:r>
-          </a:p>
-          <a:p>
-            <a:pPr algn="just"/>
+              <a:t>https://github.com/OnePantheon/Ateliers-deno/tree/main/01 - Introduction</a:t>
+            </a:r>
             <a:endParaRPr lang="fr-FR" dirty="0">
               <a:solidFill>
                 <a:srgbClr val="F2F2F2"/>

</xml_diff>

<commit_message>
seance2: Création du sujet et de la solution
</commit_message>
<xml_diff>
--- a/01 - Introduction/documents/Introduction à Deno.pptx
+++ b/01 - Introduction/documents/Introduction à Deno.pptx
@@ -233,7 +233,7 @@
           <a:p>
             <a:fld id="{2037FBD7-2019-4374-937A-AEDD8199B19C}" type="datetimeFigureOut">
               <a:rPr lang="fr-FR" smtClean="0"/>
-              <a:t>31/01/2023</a:t>
+              <a:t>01/02/2023</a:t>
             </a:fld>
             <a:endParaRPr lang="fr-FR"/>
           </a:p>
@@ -2152,7 +2152,7 @@
           <a:p>
             <a:fld id="{CD5AFD8F-5A94-48C1-88E7-572D0183627F}" type="datetimeFigureOut">
               <a:rPr lang="fr-FR" smtClean="0"/>
-              <a:t>31/01/2023</a:t>
+              <a:t>01/02/2023</a:t>
             </a:fld>
             <a:endParaRPr lang="fr-FR"/>
           </a:p>
@@ -2397,7 +2397,7 @@
           <a:p>
             <a:fld id="{CD5AFD8F-5A94-48C1-88E7-572D0183627F}" type="datetimeFigureOut">
               <a:rPr lang="fr-FR" smtClean="0"/>
-              <a:t>31/01/2023</a:t>
+              <a:t>01/02/2023</a:t>
             </a:fld>
             <a:endParaRPr lang="fr-FR"/>
           </a:p>
@@ -2605,7 +2605,7 @@
           <a:p>
             <a:fld id="{CD5AFD8F-5A94-48C1-88E7-572D0183627F}" type="datetimeFigureOut">
               <a:rPr lang="fr-FR" smtClean="0"/>
-              <a:t>31/01/2023</a:t>
+              <a:t>01/02/2023</a:t>
             </a:fld>
             <a:endParaRPr lang="fr-FR"/>
           </a:p>
@@ -2803,7 +2803,7 @@
           <a:p>
             <a:fld id="{CD5AFD8F-5A94-48C1-88E7-572D0183627F}" type="datetimeFigureOut">
               <a:rPr lang="fr-FR" smtClean="0"/>
-              <a:t>31/01/2023</a:t>
+              <a:t>01/02/2023</a:t>
             </a:fld>
             <a:endParaRPr lang="fr-FR"/>
           </a:p>
@@ -3078,7 +3078,7 @@
           <a:p>
             <a:fld id="{CD5AFD8F-5A94-48C1-88E7-572D0183627F}" type="datetimeFigureOut">
               <a:rPr lang="fr-FR" smtClean="0"/>
-              <a:t>31/01/2023</a:t>
+              <a:t>01/02/2023</a:t>
             </a:fld>
             <a:endParaRPr lang="fr-FR"/>
           </a:p>
@@ -3343,7 +3343,7 @@
           <a:p>
             <a:fld id="{CD5AFD8F-5A94-48C1-88E7-572D0183627F}" type="datetimeFigureOut">
               <a:rPr lang="fr-FR" smtClean="0"/>
-              <a:t>31/01/2023</a:t>
+              <a:t>01/02/2023</a:t>
             </a:fld>
             <a:endParaRPr lang="fr-FR"/>
           </a:p>
@@ -3755,7 +3755,7 @@
           <a:p>
             <a:fld id="{CD5AFD8F-5A94-48C1-88E7-572D0183627F}" type="datetimeFigureOut">
               <a:rPr lang="fr-FR" smtClean="0"/>
-              <a:t>31/01/2023</a:t>
+              <a:t>01/02/2023</a:t>
             </a:fld>
             <a:endParaRPr lang="fr-FR"/>
           </a:p>
@@ -3896,7 +3896,7 @@
           <a:p>
             <a:fld id="{CD5AFD8F-5A94-48C1-88E7-572D0183627F}" type="datetimeFigureOut">
               <a:rPr lang="fr-FR" smtClean="0"/>
-              <a:t>31/01/2023</a:t>
+              <a:t>01/02/2023</a:t>
             </a:fld>
             <a:endParaRPr lang="fr-FR"/>
           </a:p>
@@ -4009,7 +4009,7 @@
           <a:p>
             <a:fld id="{CD5AFD8F-5A94-48C1-88E7-572D0183627F}" type="datetimeFigureOut">
               <a:rPr lang="fr-FR" smtClean="0"/>
-              <a:t>31/01/2023</a:t>
+              <a:t>01/02/2023</a:t>
             </a:fld>
             <a:endParaRPr lang="fr-FR"/>
           </a:p>
@@ -4320,7 +4320,7 @@
           <a:p>
             <a:fld id="{CD5AFD8F-5A94-48C1-88E7-572D0183627F}" type="datetimeFigureOut">
               <a:rPr lang="fr-FR" smtClean="0"/>
-              <a:t>31/01/2023</a:t>
+              <a:t>01/02/2023</a:t>
             </a:fld>
             <a:endParaRPr lang="fr-FR"/>
           </a:p>
@@ -4608,7 +4608,7 @@
           <a:p>
             <a:fld id="{CD5AFD8F-5A94-48C1-88E7-572D0183627F}" type="datetimeFigureOut">
               <a:rPr lang="fr-FR" smtClean="0"/>
-              <a:t>31/01/2023</a:t>
+              <a:t>01/02/2023</a:t>
             </a:fld>
             <a:endParaRPr lang="fr-FR"/>
           </a:p>
@@ -4852,7 +4852,7 @@
           <a:p>
             <a:fld id="{CD5AFD8F-5A94-48C1-88E7-572D0183627F}" type="datetimeFigureOut">
               <a:rPr lang="fr-FR" smtClean="0"/>
-              <a:t>31/01/2023</a:t>
+              <a:t>01/02/2023</a:t>
             </a:fld>
             <a:endParaRPr lang="fr-FR"/>
           </a:p>
@@ -9270,7 +9270,7 @@
                   <a:srgbClr val="F9FAFB"/>
                 </a:solidFill>
               </a:rPr>
-              <a:t>Prochaine séance</a:t>
+              <a:t>TP</a:t>
             </a:r>
           </a:p>
         </p:txBody>
@@ -9292,7 +9292,7 @@
         <p:spPr>
           <a:xfrm>
             <a:off x="640080" y="1850008"/>
-            <a:ext cx="7571765" cy="4133490"/>
+            <a:ext cx="6761617" cy="4133490"/>
           </a:xfrm>
           <a:prstGeom prst="rect">
             <a:avLst/>
@@ -9300,7 +9300,7 @@
         </p:spPr>
         <p:txBody>
           <a:bodyPr vert="horz" lIns="91440" tIns="45720" rIns="91440" bIns="45720" rtlCol="0">
-            <a:normAutofit fontScale="92500" lnSpcReduction="10000"/>
+            <a:normAutofit/>
           </a:bodyPr>
           <a:lstStyle>
             <a:lvl1pPr marL="0" indent="0" algn="ctr" defTabSz="914400" rtl="0" eaLnBrk="1" latinLnBrk="0" hangingPunct="1">
@@ -9475,25 +9475,7 @@
                 </a:solidFill>
                 <a:ea typeface="Segoe UI Black" panose="020B0A02040204020203" pitchFamily="34" charset="0"/>
               </a:rPr>
-              <a:t>- Pratique avec le protocole </a:t>
-            </a:r>
-            <a:r>
-              <a:rPr lang="fr-FR" sz="3200" b="1" dirty="0" err="1">
-                <a:solidFill>
-                  <a:srgbClr val="F9FAFB"/>
-                </a:solidFill>
-                <a:ea typeface="Segoe UI Black" panose="020B0A02040204020203" pitchFamily="34" charset="0"/>
-              </a:rPr>
-              <a:t>Oauth</a:t>
-            </a:r>
-            <a:r>
-              <a:rPr lang="fr-FR" sz="3200" b="1" dirty="0">
-                <a:solidFill>
-                  <a:srgbClr val="F9FAFB"/>
-                </a:solidFill>
-                <a:ea typeface="Segoe UI Black" panose="020B0A02040204020203" pitchFamily="34" charset="0"/>
-              </a:rPr>
-              <a:t> 2 -</a:t>
+              <a:t>Pratique avec le protocole Oauth2</a:t>
             </a:r>
           </a:p>
           <a:p>
@@ -9512,39 +9494,7 @@
                   <a:srgbClr val="F2F2F2"/>
                 </a:solidFill>
               </a:rPr>
-              <a:t>Sujet : Faire une application listant les différents serveurs discord d’une personne, et la déployer en </a:t>
-            </a:r>
-            <a:r>
-              <a:rPr lang="fr-FR" dirty="0" err="1">
-                <a:solidFill>
-                  <a:srgbClr val="F2F2F2"/>
-                </a:solidFill>
-              </a:rPr>
-              <a:t>edge</a:t>
-            </a:r>
-            <a:r>
-              <a:rPr lang="fr-FR" dirty="0">
-                <a:solidFill>
-                  <a:srgbClr val="F2F2F2"/>
-                </a:solidFill>
-              </a:rPr>
-              <a:t> </a:t>
-            </a:r>
-            <a:r>
-              <a:rPr lang="fr-FR" dirty="0" err="1">
-                <a:solidFill>
-                  <a:srgbClr val="F2F2F2"/>
-                </a:solidFill>
-              </a:rPr>
-              <a:t>functions</a:t>
-            </a:r>
-            <a:r>
-              <a:rPr lang="fr-FR" dirty="0">
-                <a:solidFill>
-                  <a:srgbClr val="F2F2F2"/>
-                </a:solidFill>
-              </a:rPr>
-              <a:t>.</a:t>
+              <a:t>Sujet : Faire une application listant les différents serveurs discord d’une personne</a:t>
             </a:r>
           </a:p>
           <a:p>
@@ -9557,61 +9507,6 @@
           </a:p>
           <a:p>
             <a:pPr algn="just"/>
-            <a:r>
-              <a:rPr lang="fr-FR" dirty="0">
-                <a:solidFill>
-                  <a:srgbClr val="F2F2F2"/>
-                </a:solidFill>
-              </a:rPr>
-              <a:t>Principe (selon la faisabilité) : </a:t>
-            </a:r>
-          </a:p>
-          <a:p>
-            <a:pPr marL="342900" indent="-342900" algn="just">
-              <a:buFont typeface="Arial" panose="020B0604020202020204" pitchFamily="34" charset="0"/>
-              <a:buChar char="•"/>
-            </a:pPr>
-            <a:r>
-              <a:rPr lang="fr-FR" dirty="0">
-                <a:solidFill>
-                  <a:srgbClr val="F2F2F2"/>
-                </a:solidFill>
-              </a:rPr>
-              <a:t>Un mélange entre cours et TP (</a:t>
-            </a:r>
-            <a:r>
-              <a:rPr lang="fr-FR" dirty="0" err="1">
-                <a:solidFill>
-                  <a:srgbClr val="F2F2F2"/>
-                </a:solidFill>
-              </a:rPr>
-              <a:t>prepared</a:t>
-            </a:r>
-            <a:r>
-              <a:rPr lang="fr-FR" dirty="0">
-                <a:solidFill>
-                  <a:srgbClr val="F2F2F2"/>
-                </a:solidFill>
-              </a:rPr>
-              <a:t> kata)</a:t>
-            </a:r>
-          </a:p>
-          <a:p>
-            <a:pPr marL="342900" indent="-342900" algn="just">
-              <a:buFont typeface="Arial" panose="020B0604020202020204" pitchFamily="34" charset="0"/>
-              <a:buChar char="•"/>
-            </a:pPr>
-            <a:r>
-              <a:rPr lang="fr-FR" dirty="0">
-                <a:solidFill>
-                  <a:srgbClr val="F2F2F2"/>
-                </a:solidFill>
-              </a:rPr>
-              <a:t>Une correction distribuée en PDF</a:t>
-            </a:r>
-          </a:p>
-          <a:p>
-            <a:pPr algn="just"/>
             <a:endParaRPr lang="fr-FR" dirty="0">
               <a:solidFill>
                 <a:srgbClr val="F2F2F2"/>
@@ -9626,17 +9521,17 @@
                   <a:srgbClr val="F2F2F2"/>
                 </a:solidFill>
               </a:rPr>
-              <a:t>Date : 10 février (dans une semaine) si tout va bien</a:t>
+              <a:t>Date de rendu: 02 mars (dans un mois)</a:t>
             </a:r>
           </a:p>
         </p:txBody>
       </p:sp>
       <p:pic>
         <p:nvPicPr>
-          <p:cNvPr id="3" name="Image 2">
-            <a:extLst>
-              <a:ext uri="{FF2B5EF4-FFF2-40B4-BE49-F238E27FC236}">
-                <a16:creationId xmlns:a16="http://schemas.microsoft.com/office/drawing/2014/main" id="{9CC30C9D-DDFE-43E4-814D-791B230371EB}"/>
+          <p:cNvPr id="4" name="Image 3">
+            <a:extLst>
+              <a:ext uri="{FF2B5EF4-FFF2-40B4-BE49-F238E27FC236}">
+                <a16:creationId xmlns:a16="http://schemas.microsoft.com/office/drawing/2014/main" id="{3DFBDB45-86F8-0667-9E5B-CD31A3E81ED0}"/>
               </a:ext>
             </a:extLst>
           </p:cNvPr>
@@ -9653,8 +9548,8 @@
         </p:blipFill>
         <p:spPr>
           <a:xfrm>
-            <a:off x="8359334" y="1850008"/>
-            <a:ext cx="3551981" cy="3405573"/>
+            <a:off x="7555559" y="787645"/>
+            <a:ext cx="4407241" cy="4597678"/>
           </a:xfrm>
           <a:prstGeom prst="rect">
             <a:avLst/>
@@ -16856,9 +16751,12 @@
 </file>
 
 <file path=customXml/item1.xml><?xml version="1.0" encoding="utf-8"?>
-<p:properties xmlns:p="http://schemas.microsoft.com/office/2006/metadata/properties" xmlns:xsi="http://www.w3.org/2001/XMLSchema-instance" xmlns:pc="http://schemas.microsoft.com/office/infopath/2007/PartnerControls">
-  <documentManagement/>
-</p:properties>
+<?mso-contentType ?>
+<FormTemplates xmlns="http://schemas.microsoft.com/sharepoint/v3/contenttype/forms">
+  <Display>DocumentLibraryForm</Display>
+  <Edit>DocumentLibraryForm</Edit>
+  <New>DocumentLibraryForm</New>
+</FormTemplates>
 </file>
 
 <file path=customXml/item2.xml><?xml version="1.0" encoding="utf-8"?>
@@ -17059,27 +16957,15 @@
 </file>
 
 <file path=customXml/item3.xml><?xml version="1.0" encoding="utf-8"?>
-<?mso-contentType ?>
-<FormTemplates xmlns="http://schemas.microsoft.com/sharepoint/v3/contenttype/forms">
-  <Display>DocumentLibraryForm</Display>
-  <Edit>DocumentLibraryForm</Edit>
-  <New>DocumentLibraryForm</New>
-</FormTemplates>
+<p:properties xmlns:p="http://schemas.microsoft.com/office/2006/metadata/properties" xmlns:xsi="http://www.w3.org/2001/XMLSchema-instance" xmlns:pc="http://schemas.microsoft.com/office/infopath/2007/PartnerControls">
+  <documentManagement/>
+</p:properties>
 </file>
 
 <file path=customXml/itemProps1.xml><?xml version="1.0" encoding="utf-8"?>
-<ds:datastoreItem xmlns:ds="http://schemas.openxmlformats.org/officeDocument/2006/customXml" ds:itemID="{82637C41-7C24-4CA0-85B9-150BFD021E9E}">
+<ds:datastoreItem xmlns:ds="http://schemas.openxmlformats.org/officeDocument/2006/customXml" ds:itemID="{92B60350-0D53-4858-BF2E-E7968DE3BA2A}">
   <ds:schemaRefs>
-    <ds:schemaRef ds:uri="http://purl.org/dc/elements/1.1/"/>
-    <ds:schemaRef ds:uri="http://schemas.microsoft.com/office/2006/metadata/properties"/>
-    <ds:schemaRef ds:uri="8eeca899-c237-45b3-92b5-1d210d313a1f"/>
-    <ds:schemaRef ds:uri="http://purl.org/dc/terms/"/>
-    <ds:schemaRef ds:uri="http://schemas.openxmlformats.org/package/2006/metadata/core-properties"/>
-    <ds:schemaRef ds:uri="http://schemas.microsoft.com/office/2006/documentManagement/types"/>
-    <ds:schemaRef ds:uri="http://schemas.microsoft.com/office/infopath/2007/PartnerControls"/>
-    <ds:schemaRef ds:uri="dd528855-a031-4ba7-abc4-765c5a2fb749"/>
-    <ds:schemaRef ds:uri="http://www.w3.org/XML/1998/namespace"/>
-    <ds:schemaRef ds:uri="http://purl.org/dc/dcmitype/"/>
+    <ds:schemaRef ds:uri="http://schemas.microsoft.com/sharepoint/v3/contenttype/forms"/>
   </ds:schemaRefs>
 </ds:datastoreItem>
 </file>
@@ -17104,9 +16990,18 @@
 </file>
 
 <file path=customXml/itemProps3.xml><?xml version="1.0" encoding="utf-8"?>
-<ds:datastoreItem xmlns:ds="http://schemas.openxmlformats.org/officeDocument/2006/customXml" ds:itemID="{92B60350-0D53-4858-BF2E-E7968DE3BA2A}">
+<ds:datastoreItem xmlns:ds="http://schemas.openxmlformats.org/officeDocument/2006/customXml" ds:itemID="{82637C41-7C24-4CA0-85B9-150BFD021E9E}">
   <ds:schemaRefs>
-    <ds:schemaRef ds:uri="http://schemas.microsoft.com/sharepoint/v3/contenttype/forms"/>
+    <ds:schemaRef ds:uri="http://purl.org/dc/elements/1.1/"/>
+    <ds:schemaRef ds:uri="http://schemas.microsoft.com/office/2006/metadata/properties"/>
+    <ds:schemaRef ds:uri="8eeca899-c237-45b3-92b5-1d210d313a1f"/>
+    <ds:schemaRef ds:uri="http://purl.org/dc/terms/"/>
+    <ds:schemaRef ds:uri="http://schemas.openxmlformats.org/package/2006/metadata/core-properties"/>
+    <ds:schemaRef ds:uri="http://schemas.microsoft.com/office/2006/documentManagement/types"/>
+    <ds:schemaRef ds:uri="http://schemas.microsoft.com/office/infopath/2007/PartnerControls"/>
+    <ds:schemaRef ds:uri="dd528855-a031-4ba7-abc4-765c5a2fb749"/>
+    <ds:schemaRef ds:uri="http://www.w3.org/XML/1998/namespace"/>
+    <ds:schemaRef ds:uri="http://purl.org/dc/dcmitype/"/>
   </ds:schemaRefs>
 </ds:datastoreItem>
 </file>
</xml_diff>